<commit_message>
Documentação e Apresentação Atualizadas
</commit_message>
<xml_diff>
--- a/Documentation/Apresentação TG.pptx
+++ b/Documentation/Apresentação TG.pptx
@@ -227,7 +227,7 @@
           <a:p>
             <a:fld id="{957E3F99-D12F-4954-A61D-F49FB68D10A3}" type="datetimeFigureOut">
               <a:rPr lang="pt-BR" smtClean="0"/>
-              <a:t>20/05/2022</a:t>
+              <a:t>23/05/2022</a:t>
             </a:fld>
             <a:endParaRPr lang="pt-BR"/>
           </a:p>
@@ -392,7 +392,7 @@
           <a:p>
             <a:fld id="{9957FB3D-CA2F-9B4E-AE1C-D66054431060}" type="datetimeFigureOut">
               <a:rPr lang="pt-BR" smtClean="0"/>
-              <a:t>20/05/2022</a:t>
+              <a:t>23/05/2022</a:t>
             </a:fld>
             <a:endParaRPr lang="pt-BR"/>
           </a:p>
@@ -722,7 +722,7 @@
           <a:p>
             <a:fld id="{2E60D82F-4EDC-49F1-9B28-C237C8B75C57}" type="datetimeFigureOut">
               <a:rPr lang="pt-BR" smtClean="0"/>
-              <a:t>20/05/2022</a:t>
+              <a:t>23/05/2022</a:t>
             </a:fld>
             <a:endParaRPr lang="pt-BR"/>
           </a:p>
@@ -869,7 +869,7 @@
           <a:p>
             <a:fld id="{2E60D82F-4EDC-49F1-9B28-C237C8B75C57}" type="datetimeFigureOut">
               <a:rPr lang="pt-BR" smtClean="0"/>
-              <a:t>20/05/2022</a:t>
+              <a:t>23/05/2022</a:t>
             </a:fld>
             <a:endParaRPr lang="pt-BR"/>
           </a:p>
@@ -993,7 +993,7 @@
           <a:p>
             <a:fld id="{2E60D82F-4EDC-49F1-9B28-C237C8B75C57}" type="datetimeFigureOut">
               <a:rPr lang="pt-BR" smtClean="0"/>
-              <a:t>20/05/2022</a:t>
+              <a:t>23/05/2022</a:t>
             </a:fld>
             <a:endParaRPr lang="pt-BR"/>
           </a:p>
@@ -1140,7 +1140,7 @@
           <a:p>
             <a:fld id="{2E60D82F-4EDC-49F1-9B28-C237C8B75C57}" type="datetimeFigureOut">
               <a:rPr lang="pt-BR" smtClean="0"/>
-              <a:t>20/05/2022</a:t>
+              <a:t>23/05/2022</a:t>
             </a:fld>
             <a:endParaRPr lang="pt-BR"/>
           </a:p>
@@ -1287,7 +1287,7 @@
           <a:p>
             <a:fld id="{2E60D82F-4EDC-49F1-9B28-C237C8B75C57}" type="datetimeFigureOut">
               <a:rPr lang="pt-BR" smtClean="0"/>
-              <a:t>20/05/2022</a:t>
+              <a:t>23/05/2022</a:t>
             </a:fld>
             <a:endParaRPr lang="pt-BR"/>
           </a:p>
@@ -1528,7 +1528,7 @@
           <a:p>
             <a:fld id="{2E60D82F-4EDC-49F1-9B28-C237C8B75C57}" type="datetimeFigureOut">
               <a:rPr lang="pt-BR" smtClean="0"/>
-              <a:t>20/05/2022</a:t>
+              <a:t>23/05/2022</a:t>
             </a:fld>
             <a:endParaRPr lang="pt-BR"/>
           </a:p>
@@ -2184,7 +2184,7 @@
                   <a:schemeClr val="bg1"/>
                 </a:solidFill>
               </a:rPr>
-              <a:t>MARKETING TOUR SÃO ROQUE E VOCÊ</a:t>
+              <a:t>MARKET TOUR MINHA CIDADE E VOCÊ</a:t>
             </a:r>
           </a:p>
         </p:txBody>
@@ -2799,7 +2799,7 @@
                   <a:schemeClr val="bg1"/>
                 </a:solidFill>
               </a:rPr>
-              <a:t>MARKETING TOUR SÃO ROQUE E VOCÊ</a:t>
+              <a:t>MARKET TOUR MINHA CIDADE E VOCÊ</a:t>
             </a:r>
           </a:p>
         </p:txBody>
@@ -3418,7 +3418,7 @@
                   <a:schemeClr val="bg1"/>
                 </a:solidFill>
               </a:rPr>
-              <a:t>MARKETING TOUR SÃO ROQUE E VOCÊ</a:t>
+              <a:t>MARKET TOUR MINHA CIDADE E VOCÊ</a:t>
             </a:r>
           </a:p>
         </p:txBody>
@@ -4512,7 +4512,7 @@
                   <a:schemeClr val="bg1"/>
                 </a:solidFill>
               </a:rPr>
-              <a:t>MARKETING TOUR SÃO ROQUE E VOCÊ</a:t>
+              <a:t>MARKET TOUR MINHA CIDADE E VOCÊ</a:t>
             </a:r>
           </a:p>
         </p:txBody>
@@ -5619,7 +5619,7 @@
                   <a:schemeClr val="bg1"/>
                 </a:solidFill>
               </a:rPr>
-              <a:t>MARKETING TOUR SÃO ROQUE E VOCÊ</a:t>
+              <a:t>MARKET TOUR MINHA CIDADE E VOCÊ</a:t>
             </a:r>
           </a:p>
         </p:txBody>
@@ -6254,7 +6254,7 @@
                   <a:schemeClr val="bg1"/>
                 </a:solidFill>
               </a:rPr>
-              <a:t>MARKETING TOUR SÃO ROQUE E VOCÊ</a:t>
+              <a:t>MARKET TOUR MINHA CIDADE E VOCÊ</a:t>
             </a:r>
           </a:p>
         </p:txBody>
@@ -6750,7 +6750,7 @@
                   <a:schemeClr val="bg1"/>
                 </a:solidFill>
               </a:rPr>
-              <a:t>MARKETING TOUR SÃO ROQUE E VOCÊ</a:t>
+              <a:t>MARKET TOUR MINHA CIDADE E VOCÊ</a:t>
             </a:r>
           </a:p>
         </p:txBody>
@@ -7222,7 +7222,7 @@
                   <a:schemeClr val="bg1"/>
                 </a:solidFill>
               </a:rPr>
-              <a:t>MARKETING TOUR SÃO ROQUE E VOCÊ</a:t>
+              <a:t>MARKET TOUR MINHA CIDADE E VOCÊ</a:t>
             </a:r>
           </a:p>
         </p:txBody>
@@ -7683,7 +7683,7 @@
                   <a:schemeClr val="bg1"/>
                 </a:solidFill>
               </a:rPr>
-              <a:t>MARKETING TOUR SÃO ROQUE E VOCÊ</a:t>
+              <a:t>MARKET TOUR MINHA CIDADE E VOCÊ</a:t>
             </a:r>
           </a:p>
         </p:txBody>
@@ -8144,7 +8144,7 @@
                   <a:schemeClr val="bg1"/>
                 </a:solidFill>
               </a:rPr>
-              <a:t>MARKETING TOUR SÃO ROQUE E VOCÊ</a:t>
+              <a:t>MARKET TOUR MINHA CIDADE E VOCÊ</a:t>
             </a:r>
           </a:p>
         </p:txBody>
@@ -8601,7 +8601,7 @@
                   <a:schemeClr val="bg1"/>
                 </a:solidFill>
               </a:rPr>
-              <a:t>MARKETING TOUR SÃO ROQUE E VOCÊ</a:t>
+              <a:t>MARKET TOUR MINHA CIDADE E VOCÊ</a:t>
             </a:r>
           </a:p>
         </p:txBody>
@@ -9699,7 +9699,7 @@
                   <a:schemeClr val="bg1"/>
                 </a:solidFill>
               </a:rPr>
-              <a:t>MARKETING TOUR SÃO ROQUE E VOCÊ</a:t>
+              <a:t>MARKET TOUR MINHA CIDADE E VOCÊ</a:t>
             </a:r>
           </a:p>
         </p:txBody>
@@ -10369,7 +10369,7 @@
                   <a:schemeClr val="bg1"/>
                 </a:solidFill>
               </a:rPr>
-              <a:t>MARKETING TOUR SÃO ROQUE E VOCÊ</a:t>
+              <a:t>MARKET TOUR MINHA CIDADE E VOCÊ</a:t>
             </a:r>
           </a:p>
         </p:txBody>
@@ -11148,7 +11148,7 @@
                   <a:schemeClr val="bg1"/>
                 </a:solidFill>
               </a:rPr>
-              <a:t>MARKETING TOUR SÃO ROQUE E VOCÊ</a:t>
+              <a:t>MARKET TOUR MINHA CIDADE E VOCÊ</a:t>
             </a:r>
           </a:p>
         </p:txBody>

</xml_diff>